<commit_message>
Selenium tests for sequences, and fixes
</commit_message>
<xml_diff>
--- a/testfiles/ogre_logo.pptx
+++ b/testfiles/ogre_logo.pptx
@@ -261,7 +261,7 @@
           <a:p>
             <a:fld id="{E5655551-8662-4E52-B4CC-5350FD3C2A9A}" type="datetimeFigureOut">
               <a:rPr lang="en-GB" smtClean="0"/>
-              <a:t>11/09/2018</a:t>
+              <a:t>27/09/2018</a:t>
             </a:fld>
             <a:endParaRPr lang="en-GB"/>
           </a:p>
@@ -461,7 +461,7 @@
           <a:p>
             <a:fld id="{E5655551-8662-4E52-B4CC-5350FD3C2A9A}" type="datetimeFigureOut">
               <a:rPr lang="en-GB" smtClean="0"/>
-              <a:t>11/09/2018</a:t>
+              <a:t>27/09/2018</a:t>
             </a:fld>
             <a:endParaRPr lang="en-GB"/>
           </a:p>
@@ -671,7 +671,7 @@
           <a:p>
             <a:fld id="{E5655551-8662-4E52-B4CC-5350FD3C2A9A}" type="datetimeFigureOut">
               <a:rPr lang="en-GB" smtClean="0"/>
-              <a:t>11/09/2018</a:t>
+              <a:t>27/09/2018</a:t>
             </a:fld>
             <a:endParaRPr lang="en-GB"/>
           </a:p>
@@ -871,7 +871,7 @@
           <a:p>
             <a:fld id="{E5655551-8662-4E52-B4CC-5350FD3C2A9A}" type="datetimeFigureOut">
               <a:rPr lang="en-GB" smtClean="0"/>
-              <a:t>11/09/2018</a:t>
+              <a:t>27/09/2018</a:t>
             </a:fld>
             <a:endParaRPr lang="en-GB"/>
           </a:p>
@@ -1147,7 +1147,7 @@
           <a:p>
             <a:fld id="{E5655551-8662-4E52-B4CC-5350FD3C2A9A}" type="datetimeFigureOut">
               <a:rPr lang="en-GB" smtClean="0"/>
-              <a:t>11/09/2018</a:t>
+              <a:t>27/09/2018</a:t>
             </a:fld>
             <a:endParaRPr lang="en-GB"/>
           </a:p>
@@ -1415,7 +1415,7 @@
           <a:p>
             <a:fld id="{E5655551-8662-4E52-B4CC-5350FD3C2A9A}" type="datetimeFigureOut">
               <a:rPr lang="en-GB" smtClean="0"/>
-              <a:t>11/09/2018</a:t>
+              <a:t>27/09/2018</a:t>
             </a:fld>
             <a:endParaRPr lang="en-GB"/>
           </a:p>
@@ -1830,7 +1830,7 @@
           <a:p>
             <a:fld id="{E5655551-8662-4E52-B4CC-5350FD3C2A9A}" type="datetimeFigureOut">
               <a:rPr lang="en-GB" smtClean="0"/>
-              <a:t>11/09/2018</a:t>
+              <a:t>27/09/2018</a:t>
             </a:fld>
             <a:endParaRPr lang="en-GB"/>
           </a:p>
@@ -1972,7 +1972,7 @@
           <a:p>
             <a:fld id="{E5655551-8662-4E52-B4CC-5350FD3C2A9A}" type="datetimeFigureOut">
               <a:rPr lang="en-GB" smtClean="0"/>
-              <a:t>11/09/2018</a:t>
+              <a:t>27/09/2018</a:t>
             </a:fld>
             <a:endParaRPr lang="en-GB"/>
           </a:p>
@@ -2085,7 +2085,7 @@
           <a:p>
             <a:fld id="{E5655551-8662-4E52-B4CC-5350FD3C2A9A}" type="datetimeFigureOut">
               <a:rPr lang="en-GB" smtClean="0"/>
-              <a:t>11/09/2018</a:t>
+              <a:t>27/09/2018</a:t>
             </a:fld>
             <a:endParaRPr lang="en-GB"/>
           </a:p>
@@ -2398,7 +2398,7 @@
           <a:p>
             <a:fld id="{E5655551-8662-4E52-B4CC-5350FD3C2A9A}" type="datetimeFigureOut">
               <a:rPr lang="en-GB" smtClean="0"/>
-              <a:t>11/09/2018</a:t>
+              <a:t>27/09/2018</a:t>
             </a:fld>
             <a:endParaRPr lang="en-GB"/>
           </a:p>
@@ -2687,7 +2687,7 @@
           <a:p>
             <a:fld id="{E5655551-8662-4E52-B4CC-5350FD3C2A9A}" type="datetimeFigureOut">
               <a:rPr lang="en-GB" smtClean="0"/>
-              <a:t>11/09/2018</a:t>
+              <a:t>27/09/2018</a:t>
             </a:fld>
             <a:endParaRPr lang="en-GB"/>
           </a:p>
@@ -2930,7 +2930,7 @@
           <a:p>
             <a:fld id="{E5655551-8662-4E52-B4CC-5350FD3C2A9A}" type="datetimeFigureOut">
               <a:rPr lang="en-GB" smtClean="0"/>
-              <a:t>11/09/2018</a:t>
+              <a:t>27/09/2018</a:t>
             </a:fld>
             <a:endParaRPr lang="en-GB"/>
           </a:p>
@@ -3361,8 +3361,8 @@
         </p:nvSpPr>
         <p:spPr>
           <a:xfrm>
-            <a:off x="6224631" y="2508308"/>
-            <a:ext cx="4320165" cy="2080470"/>
+            <a:off x="5343787" y="2508308"/>
+            <a:ext cx="5201009" cy="2080470"/>
           </a:xfrm>
           <a:prstGeom prst="roundRect">
             <a:avLst/>
@@ -3396,13 +3396,13 @@
           <a:p>
             <a:pPr algn="ctr"/>
             <a:r>
-              <a:rPr lang="en-GB" sz="11500" dirty="0">
+              <a:rPr lang="en-GB" sz="11500" dirty="0" err="1">
                 <a:solidFill>
                   <a:schemeClr val="tx1"/>
                 </a:solidFill>
                 <a:latin typeface="Algerian" panose="04020705040A02060702" pitchFamily="82" charset="0"/>
               </a:rPr>
-              <a:t>Ogre</a:t>
+              <a:t>OgrDB</a:t>
             </a:r>
             <a:endParaRPr lang="en-GB" sz="8800" dirty="0">
               <a:solidFill>

</xml_diff>